<commit_message>
talk given at CUHK
</commit_message>
<xml_diff>
--- a/spspt/plots.pptx
+++ b/spspt/plots.pptx
@@ -4057,8 +4057,8 @@
         </p:nvSpPr>
         <p:spPr>
           <a:xfrm>
-            <a:off x="2533135" y="2360141"/>
-            <a:ext cx="184731" cy="369332"/>
+            <a:off x="2361833" y="2349092"/>
+            <a:ext cx="319318" cy="369332"/>
           </a:xfrm>
           <a:prstGeom prst="rect">
             <a:avLst/>
@@ -4071,7 +4071,10 @@
           </a:bodyPr>
           <a:lstStyle/>
           <a:p>
-            <a:endParaRPr lang="en-US" dirty="0"/>
+            <a:r>
+              <a:rPr lang="en-US" dirty="0"/>
+              <a:t>𝜎</a:t>
+            </a:r>
           </a:p>
         </p:txBody>
       </p:sp>

</xml_diff>